<commit_message>
Corrected data on Israeli soldiers
</commit_message>
<xml_diff>
--- a/plots/plots.pptx
+++ b/plots/plots.pptx
@@ -3547,7 +3547,7 @@
       </p:grpSpPr>
       <p:pic>
         <p:nvPicPr>
-          <p:cNvPr id="3074" name="Picture 2"/>
+          <p:cNvPr id="1026" name="Picture 2"/>
           <p:cNvPicPr>
             <a:picLocks noChangeAspect="1" noChangeArrowheads="1"/>
           </p:cNvPicPr>
@@ -3967,7 +3967,7 @@
       </p:grpSpPr>
       <p:pic>
         <p:nvPicPr>
-          <p:cNvPr id="6146" name="Picture 2"/>
+          <p:cNvPr id="2051" name="Picture 3"/>
           <p:cNvPicPr>
             <a:picLocks noChangeAspect="1" noChangeArrowheads="1"/>
           </p:cNvPicPr>
@@ -3988,7 +3988,7 @@
         </p:blipFill>
         <p:spPr bwMode="auto">
           <a:xfrm>
-            <a:off x="0" y="266700"/>
+            <a:off x="-1143000" y="266700"/>
             <a:ext cx="11430000" cy="6324600"/>
           </a:xfrm>
           <a:prstGeom prst="rect">

</xml_diff>